<commit_message>
Update image in DG
</commit_message>
<xml_diff>
--- a/docs/diagrams/ModelComponentClassDiagram.pptx
+++ b/docs/diagrams/ModelComponentClassDiagram.pptx
@@ -474,6 +474,90 @@
     </a:lvl9pPr>
   </p:notesStyle>
 </p:notesMaster>
+</file>
+
+<file path=ppt/notesSlides/notesSlide1.xml><?xml version="1.0" encoding="utf-8"?>
+<p:notes xmlns:a="http://schemas.openxmlformats.org/drawingml/2006/main" xmlns:r="http://schemas.openxmlformats.org/officeDocument/2006/relationships" xmlns:p="http://schemas.openxmlformats.org/presentationml/2006/main">
+  <p:cSld>
+    <p:spTree>
+      <p:nvGrpSpPr>
+        <p:cNvPr id="1" name=""/>
+        <p:cNvGrpSpPr/>
+        <p:nvPr/>
+      </p:nvGrpSpPr>
+      <p:grpSpPr>
+        <a:xfrm>
+          <a:off x="0" y="0"/>
+          <a:ext cx="0" cy="0"/>
+          <a:chOff x="0" y="0"/>
+          <a:chExt cx="0" cy="0"/>
+        </a:xfrm>
+      </p:grpSpPr>
+      <p:sp>
+        <p:nvSpPr>
+          <p:cNvPr id="2" name="Slide Image Placeholder 1"/>
+          <p:cNvSpPr>
+            <a:spLocks noGrp="1" noRot="1" noChangeAspect="1"/>
+          </p:cNvSpPr>
+          <p:nvPr>
+            <p:ph type="sldImg"/>
+          </p:nvPr>
+        </p:nvSpPr>
+        <p:spPr/>
+      </p:sp>
+      <p:sp>
+        <p:nvSpPr>
+          <p:cNvPr id="3" name="Notes Placeholder 2"/>
+          <p:cNvSpPr>
+            <a:spLocks noGrp="1"/>
+          </p:cNvSpPr>
+          <p:nvPr>
+            <p:ph type="body" idx="1"/>
+          </p:nvPr>
+        </p:nvSpPr>
+        <p:spPr/>
+        <p:txBody>
+          <a:bodyPr/>
+          <a:lstStyle/>
+          <a:p>
+            <a:endParaRPr lang="en-SG" dirty="0"/>
+          </a:p>
+        </p:txBody>
+      </p:sp>
+      <p:sp>
+        <p:nvSpPr>
+          <p:cNvPr id="4" name="Slide Number Placeholder 3"/>
+          <p:cNvSpPr>
+            <a:spLocks noGrp="1"/>
+          </p:cNvSpPr>
+          <p:nvPr>
+            <p:ph type="sldNum" sz="quarter" idx="10"/>
+          </p:nvPr>
+        </p:nvSpPr>
+        <p:spPr/>
+        <p:txBody>
+          <a:bodyPr/>
+          <a:lstStyle/>
+          <a:p>
+            <a:fld id="{5A7AB025-77E3-4BD1-A2FD-B3183DBA47A3}" type="slidenum">
+              <a:rPr lang="en-US" smtClean="0"/>
+              <a:t>1</a:t>
+            </a:fld>
+            <a:endParaRPr lang="en-US"/>
+          </a:p>
+        </p:txBody>
+      </p:sp>
+    </p:spTree>
+    <p:extLst>
+      <p:ext uri="{BB962C8B-B14F-4D97-AF65-F5344CB8AC3E}">
+        <p14:creationId xmlns:p14="http://schemas.microsoft.com/office/powerpoint/2010/main" val="3977459200"/>
+      </p:ext>
+    </p:extLst>
+  </p:cSld>
+  <p:clrMapOvr>
+    <a:masterClrMapping/>
+  </p:clrMapOvr>
+</p:notes>
 </file>
 
 <file path=ppt/slideLayouts/slideLayout1.xml><?xml version="1.0" encoding="utf-8"?>
@@ -3472,7 +3556,7 @@
         </p:nvSpPr>
         <p:spPr>
           <a:xfrm>
-            <a:off x="1093331" y="45810"/>
+            <a:off x="945240" y="274411"/>
             <a:ext cx="7719335" cy="4754789"/>
           </a:xfrm>
           <a:prstGeom prst="roundRect">
@@ -3533,7 +3617,7 @@
         </p:nvSpPr>
         <p:spPr>
           <a:xfrm>
-            <a:off x="2877180" y="3158440"/>
+            <a:off x="2626358" y="3432851"/>
             <a:ext cx="1093635" cy="346760"/>
           </a:xfrm>
           <a:prstGeom prst="rect">
@@ -3592,7 +3676,7 @@
         </p:nvSpPr>
         <p:spPr>
           <a:xfrm rot="16200000">
-            <a:off x="1683963" y="2868687"/>
+            <a:off x="1417711" y="3143098"/>
             <a:ext cx="1093635" cy="346760"/>
           </a:xfrm>
           <a:prstGeom prst="rect">
@@ -3653,7 +3737,7 @@
         </p:nvCxnSpPr>
         <p:spPr>
           <a:xfrm flipV="1">
-            <a:off x="6477000" y="3194131"/>
+            <a:off x="6328909" y="3468542"/>
             <a:ext cx="95385" cy="416514"/>
           </a:xfrm>
           <a:prstGeom prst="bentConnector2">
@@ -3694,7 +3778,7 @@
         </p:nvCxnSpPr>
         <p:spPr>
           <a:xfrm rot="5400000" flipH="1" flipV="1">
-            <a:off x="4360065" y="1080909"/>
+            <a:off x="4093813" y="1355320"/>
             <a:ext cx="378691" cy="4637261"/>
           </a:xfrm>
           <a:prstGeom prst="bentConnector4">
@@ -3736,7 +3820,7 @@
         </p:nvSpPr>
         <p:spPr>
           <a:xfrm rot="16200000">
-            <a:off x="956202" y="2861202"/>
+            <a:off x="689950" y="3135613"/>
             <a:ext cx="1093635" cy="346760"/>
           </a:xfrm>
           <a:prstGeom prst="rect">
@@ -3806,7 +3890,7 @@
         </p:nvSpPr>
         <p:spPr>
           <a:xfrm rot="16200000">
-            <a:off x="1626910" y="2952291"/>
+            <a:off x="1360658" y="3226702"/>
             <a:ext cx="270504" cy="175523"/>
           </a:xfrm>
           <a:prstGeom prst="triangle">
@@ -3856,7 +3940,7 @@
         </p:nvCxnSpPr>
         <p:spPr>
           <a:xfrm>
-            <a:off x="2656370" y="3326536"/>
+            <a:off x="2405548" y="3600947"/>
             <a:ext cx="220810" cy="5284"/>
           </a:xfrm>
           <a:prstGeom prst="straightConnector1">
@@ -3894,7 +3978,7 @@
         </p:nvSpPr>
         <p:spPr>
           <a:xfrm rot="5400000" flipV="1">
-            <a:off x="6253986" y="3522883"/>
+            <a:off x="6105895" y="3797294"/>
             <a:ext cx="270504" cy="175523"/>
           </a:xfrm>
           <a:prstGeom prst="triangle">
@@ -3945,7 +4029,7 @@
         </p:nvCxnSpPr>
         <p:spPr>
           <a:xfrm>
-            <a:off x="910091" y="3040053"/>
+            <a:off x="762000" y="3314464"/>
             <a:ext cx="419548" cy="2860"/>
           </a:xfrm>
           <a:prstGeom prst="bentConnector3">
@@ -3990,7 +4074,7 @@
         </p:nvCxnSpPr>
         <p:spPr>
           <a:xfrm flipV="1">
-            <a:off x="1849924" y="3040052"/>
+            <a:off x="1583672" y="3314463"/>
             <a:ext cx="216105" cy="1"/>
           </a:xfrm>
           <a:prstGeom prst="line">
@@ -4029,7 +4113,7 @@
         </p:nvSpPr>
         <p:spPr>
           <a:xfrm>
-            <a:off x="2420322" y="3239846"/>
+            <a:off x="2169500" y="3514257"/>
             <a:ext cx="236048" cy="173380"/>
           </a:xfrm>
           <a:prstGeom prst="flowChartDecision">
@@ -4074,8 +4158,8 @@
         </p:nvSpPr>
         <p:spPr>
           <a:xfrm>
-            <a:off x="2879490" y="2627420"/>
-            <a:ext cx="1093635" cy="346760"/>
+            <a:off x="2620848" y="2442251"/>
+            <a:ext cx="1067896" cy="346760"/>
           </a:xfrm>
           <a:prstGeom prst="rect">
             <a:avLst/>
@@ -4122,47 +4206,6 @@
           </a:p>
         </p:txBody>
       </p:sp>
-      <p:cxnSp>
-        <p:nvCxnSpPr>
-          <p:cNvPr id="47" name="Straight Arrow Connector 46"/>
-          <p:cNvCxnSpPr>
-            <a:stCxn id="48" idx="3"/>
-            <a:endCxn id="46" idx="1"/>
-          </p:cNvCxnSpPr>
-          <p:nvPr/>
-        </p:nvCxnSpPr>
-        <p:spPr>
-          <a:xfrm>
-            <a:off x="2658680" y="2795516"/>
-            <a:ext cx="220810" cy="5284"/>
-          </a:xfrm>
-          <a:prstGeom prst="straightConnector1">
-            <a:avLst/>
-          </a:prstGeom>
-          <a:ln w="19050">
-            <a:solidFill>
-              <a:srgbClr val="7030A0"/>
-            </a:solidFill>
-            <a:headEnd type="none" w="med" len="med"/>
-            <a:tailEnd type="arrow" w="med" len="med"/>
-          </a:ln>
-          <a:effectLst/>
-        </p:spPr>
-        <p:style>
-          <a:lnRef idx="1">
-            <a:schemeClr val="accent2"/>
-          </a:lnRef>
-          <a:fillRef idx="2">
-            <a:schemeClr val="accent2"/>
-          </a:fillRef>
-          <a:effectRef idx="1">
-            <a:schemeClr val="accent2"/>
-          </a:effectRef>
-          <a:fontRef idx="minor">
-            <a:schemeClr val="dk1"/>
-          </a:fontRef>
-        </p:style>
-      </p:cxnSp>
       <p:sp>
         <p:nvSpPr>
           <p:cNvPr id="48" name="Flowchart: Decision 96"/>
@@ -4170,8 +4213,8 @@
           <p:nvPr/>
         </p:nvSpPr>
         <p:spPr>
-          <a:xfrm>
-            <a:off x="2422632" y="2708826"/>
+          <a:xfrm rot="16200000">
+            <a:off x="1849817" y="2552711"/>
             <a:ext cx="236048" cy="173380"/>
           </a:xfrm>
           <a:prstGeom prst="flowChartDecision">
@@ -4216,7 +4259,7 @@
         </p:nvSpPr>
         <p:spPr>
           <a:xfrm>
-            <a:off x="4487017" y="2847371"/>
+            <a:off x="4338926" y="3121782"/>
             <a:ext cx="1146635" cy="346760"/>
           </a:xfrm>
           <a:prstGeom prst="rect">
@@ -4272,7 +4315,7 @@
         </p:nvSpPr>
         <p:spPr>
           <a:xfrm>
-            <a:off x="3984303" y="2673991"/>
+            <a:off x="3699849" y="2539302"/>
             <a:ext cx="236048" cy="173380"/>
           </a:xfrm>
           <a:prstGeom prst="flowChartDecision">
@@ -4314,18 +4357,15 @@
       <p:cxnSp>
         <p:nvCxnSpPr>
           <p:cNvPr id="30" name="Elbow Connector 29"/>
-          <p:cNvCxnSpPr>
-            <a:stCxn id="51" idx="3"/>
-            <a:endCxn id="49" idx="1"/>
-          </p:cNvCxnSpPr>
+          <p:cNvCxnSpPr/>
           <p:nvPr/>
         </p:nvCxnSpPr>
         <p:spPr>
-          <a:xfrm>
-            <a:off x="4220351" y="2760681"/>
-            <a:ext cx="266666" cy="260070"/>
-          </a:xfrm>
-          <a:prstGeom prst="bentConnector3">
+          <a:xfrm rot="16200000" flipH="1">
+            <a:off x="3802814" y="2643425"/>
+            <a:ext cx="875404" cy="182129"/>
+          </a:xfrm>
+          <a:prstGeom prst="bentConnector2">
             <a:avLst/>
           </a:prstGeom>
           <a:ln w="19050">
@@ -4360,7 +4400,7 @@
         </p:nvSpPr>
         <p:spPr>
           <a:xfrm>
-            <a:off x="4477328" y="2280569"/>
+            <a:off x="4329237" y="2554980"/>
             <a:ext cx="1146635" cy="346760"/>
           </a:xfrm>
           <a:prstGeom prst="rect">
@@ -4418,13 +4458,13 @@
           <p:nvPr/>
         </p:nvCxnSpPr>
         <p:spPr>
-          <a:xfrm flipV="1">
-            <a:off x="4220351" y="2453949"/>
-            <a:ext cx="256977" cy="306732"/>
+          <a:xfrm>
+            <a:off x="3935897" y="2625992"/>
+            <a:ext cx="393340" cy="102368"/>
           </a:xfrm>
           <a:prstGeom prst="bentConnector3">
             <a:avLst>
-              <a:gd name="adj1" fmla="val 50000"/>
+              <a:gd name="adj1" fmla="val 54359"/>
             </a:avLst>
           </a:prstGeom>
           <a:ln w="19050">
@@ -4459,7 +4499,7 @@
         </p:nvSpPr>
         <p:spPr>
           <a:xfrm>
-            <a:off x="6313677" y="2858066"/>
+            <a:off x="6165586" y="3132477"/>
             <a:ext cx="708186" cy="346760"/>
           </a:xfrm>
           <a:prstGeom prst="rect">
@@ -4515,7 +4555,7 @@
         </p:nvSpPr>
         <p:spPr>
           <a:xfrm>
-            <a:off x="5643227" y="2943979"/>
+            <a:off x="5495136" y="3218390"/>
             <a:ext cx="236048" cy="173380"/>
           </a:xfrm>
           <a:prstGeom prst="flowChartDecision">
@@ -4563,7 +4603,7 @@
         </p:nvCxnSpPr>
         <p:spPr>
           <a:xfrm>
-            <a:off x="5879275" y="3030669"/>
+            <a:off x="5731184" y="3305080"/>
             <a:ext cx="434402" cy="777"/>
           </a:xfrm>
           <a:prstGeom prst="bentConnector3">
@@ -4601,7 +4641,7 @@
         </p:nvSpPr>
         <p:spPr>
           <a:xfrm>
-            <a:off x="5336105" y="1809332"/>
+            <a:off x="5188014" y="2083743"/>
             <a:ext cx="483700" cy="346760"/>
           </a:xfrm>
           <a:prstGeom prst="rect">
@@ -4657,7 +4697,7 @@
         </p:nvSpPr>
         <p:spPr>
           <a:xfrm rot="16200000">
-            <a:off x="4921666" y="2066540"/>
+            <a:off x="4773575" y="2340951"/>
             <a:ext cx="236048" cy="173380"/>
           </a:xfrm>
           <a:prstGeom prst="flowChartDecision">
@@ -4705,7 +4745,7 @@
         </p:nvCxnSpPr>
         <p:spPr>
           <a:xfrm rot="5400000" flipH="1" flipV="1">
-            <a:off x="5161650" y="1860752"/>
+            <a:off x="5013559" y="2135163"/>
             <a:ext cx="52494" cy="296415"/>
           </a:xfrm>
           <a:prstGeom prst="bentConnector2">
@@ -4743,7 +4783,7 @@
         </p:nvSpPr>
         <p:spPr>
           <a:xfrm>
-            <a:off x="5128257" y="3429000"/>
+            <a:off x="4980166" y="3703411"/>
             <a:ext cx="1156969" cy="346760"/>
           </a:xfrm>
           <a:prstGeom prst="rect">
@@ -4814,7 +4854,7 @@
         </p:nvSpPr>
         <p:spPr>
           <a:xfrm>
-            <a:off x="7712397" y="2564238"/>
+            <a:off x="7564306" y="2838649"/>
             <a:ext cx="815410" cy="285783"/>
           </a:xfrm>
           <a:prstGeom prst="rect">
@@ -4870,7 +4910,7 @@
         </p:nvSpPr>
         <p:spPr>
           <a:xfrm>
-            <a:off x="7041947" y="2948201"/>
+            <a:off x="6893856" y="3222612"/>
             <a:ext cx="236048" cy="173380"/>
           </a:xfrm>
           <a:prstGeom prst="flowChartDecision">
@@ -4920,7 +4960,7 @@
         </p:nvCxnSpPr>
         <p:spPr>
           <a:xfrm flipV="1">
-            <a:off x="7277995" y="2707130"/>
+            <a:off x="7129904" y="2981541"/>
             <a:ext cx="434402" cy="327761"/>
           </a:xfrm>
           <a:prstGeom prst="bentConnector3">
@@ -4958,7 +4998,7 @@
         </p:nvSpPr>
         <p:spPr>
           <a:xfrm>
-            <a:off x="7712397" y="2887216"/>
+            <a:off x="7564306" y="3161627"/>
             <a:ext cx="815410" cy="285783"/>
           </a:xfrm>
           <a:prstGeom prst="rect">
@@ -5017,7 +5057,7 @@
         </p:nvCxnSpPr>
         <p:spPr>
           <a:xfrm flipV="1">
-            <a:off x="7277995" y="3030108"/>
+            <a:off x="7129904" y="3304519"/>
             <a:ext cx="434402" cy="4783"/>
           </a:xfrm>
           <a:prstGeom prst="bentConnector3">
@@ -5055,7 +5095,7 @@
         </p:nvSpPr>
         <p:spPr>
           <a:xfrm>
-            <a:off x="7712397" y="3210194"/>
+            <a:off x="7564306" y="3484605"/>
             <a:ext cx="815410" cy="285783"/>
           </a:xfrm>
           <a:prstGeom prst="rect">
@@ -5114,7 +5154,7 @@
         </p:nvCxnSpPr>
         <p:spPr>
           <a:xfrm>
-            <a:off x="7277995" y="3034891"/>
+            <a:off x="7129904" y="3309302"/>
             <a:ext cx="434402" cy="318195"/>
           </a:xfrm>
           <a:prstGeom prst="bentConnector3">
@@ -5152,7 +5192,7 @@
         </p:nvSpPr>
         <p:spPr>
           <a:xfrm>
-            <a:off x="7712397" y="3533171"/>
+            <a:off x="7564306" y="3807582"/>
             <a:ext cx="815410" cy="285783"/>
           </a:xfrm>
           <a:prstGeom prst="rect">
@@ -5211,7 +5251,7 @@
         </p:nvCxnSpPr>
         <p:spPr>
           <a:xfrm>
-            <a:off x="7277995" y="3034891"/>
+            <a:off x="7129904" y="3309302"/>
             <a:ext cx="434402" cy="641172"/>
           </a:xfrm>
           <a:prstGeom prst="bentConnector3">
@@ -5251,7 +5291,7 @@
         </p:nvCxnSpPr>
         <p:spPr>
           <a:xfrm rot="16200000" flipH="1">
-            <a:off x="3279321" y="2485431"/>
+            <a:off x="2985527" y="2261098"/>
             <a:ext cx="293825" cy="1"/>
           </a:xfrm>
           <a:prstGeom prst="bentConnector3">
@@ -5292,7 +5332,7 @@
         </p:nvSpPr>
         <p:spPr>
           <a:xfrm rot="10800000" flipV="1">
-            <a:off x="3290981" y="2162997"/>
+            <a:off x="2997187" y="1938664"/>
             <a:ext cx="270504" cy="175523"/>
           </a:xfrm>
           <a:prstGeom prst="triangle">
@@ -5340,7 +5380,7 @@
         </p:nvSpPr>
         <p:spPr>
           <a:xfrm>
-            <a:off x="2660303" y="1806470"/>
+            <a:off x="2366509" y="1582137"/>
             <a:ext cx="1539926" cy="346760"/>
           </a:xfrm>
           <a:prstGeom prst="rect">
@@ -5411,7 +5451,7 @@
         </p:nvSpPr>
         <p:spPr>
           <a:xfrm rot="16200000">
-            <a:off x="6527512" y="3586305"/>
+            <a:off x="6290995" y="3894097"/>
             <a:ext cx="881018" cy="261610"/>
           </a:xfrm>
           <a:prstGeom prst="rect">
@@ -5450,7 +5490,7 @@
         </p:nvSpPr>
         <p:spPr>
           <a:xfrm>
-            <a:off x="2057401" y="4239491"/>
+            <a:off x="1909310" y="4513902"/>
             <a:ext cx="1066800" cy="346760"/>
           </a:xfrm>
           <a:prstGeom prst="rect">
@@ -5491,7 +5531,7 @@
               <a:t>&lt;&lt;interface&gt;&gt;</a:t>
             </a:r>
             <a:r>
-              <a:rPr lang="en-US" sz="1050">
+              <a:rPr lang="en-US" sz="1050" dirty="0">
                 <a:solidFill>
                   <a:srgbClr val="7030A0"/>
                 </a:solidFill>
@@ -5499,7 +5539,7 @@
               <a:t/>
             </a:r>
             <a:br>
-              <a:rPr lang="en-US" sz="1050">
+              <a:rPr lang="en-US" sz="1050" dirty="0">
                 <a:solidFill>
                   <a:srgbClr val="7030A0"/>
                 </a:solidFill>
@@ -5532,8 +5572,8 @@
         </p:nvCxnSpPr>
         <p:spPr>
           <a:xfrm rot="16200000" flipH="1">
-            <a:off x="1364475" y="3719944"/>
-            <a:ext cx="831471" cy="554381"/>
+            <a:off x="1157304" y="3935275"/>
+            <a:ext cx="831471" cy="672542"/>
           </a:xfrm>
           <a:prstGeom prst="bentConnector2">
             <a:avLst/>
@@ -5574,7 +5614,7 @@
         </p:nvCxnSpPr>
         <p:spPr>
           <a:xfrm rot="16200000" flipV="1">
-            <a:off x="5943809" y="2134104"/>
+            <a:off x="5795718" y="2408515"/>
             <a:ext cx="404117" cy="1043807"/>
           </a:xfrm>
           <a:prstGeom prst="bentConnector2">
@@ -5612,7 +5652,7 @@
         </p:nvSpPr>
         <p:spPr>
           <a:xfrm>
-            <a:off x="4324972" y="2191228"/>
+            <a:off x="4176881" y="2465639"/>
             <a:ext cx="189257" cy="178683"/>
           </a:xfrm>
           <a:prstGeom prst="rect">
@@ -5651,7 +5691,7 @@
         </p:nvSpPr>
         <p:spPr>
           <a:xfrm>
-            <a:off x="4324972" y="3058864"/>
+            <a:off x="4139980" y="2966738"/>
             <a:ext cx="189257" cy="178683"/>
           </a:xfrm>
           <a:prstGeom prst="rect">
@@ -5690,7 +5730,7 @@
         </p:nvSpPr>
         <p:spPr>
           <a:xfrm>
-            <a:off x="5689761" y="2495413"/>
+            <a:off x="5541670" y="2769824"/>
             <a:ext cx="189257" cy="178683"/>
           </a:xfrm>
           <a:prstGeom prst="rect">
@@ -5729,7 +5769,7 @@
         </p:nvSpPr>
         <p:spPr>
           <a:xfrm>
-            <a:off x="5163172" y="1778919"/>
+            <a:off x="5015081" y="2053330"/>
             <a:ext cx="189257" cy="178683"/>
           </a:xfrm>
           <a:prstGeom prst="rect">
@@ -5768,7 +5808,7 @@
         </p:nvSpPr>
         <p:spPr>
           <a:xfrm>
-            <a:off x="6135256" y="3097917"/>
+            <a:off x="5987165" y="3372328"/>
             <a:ext cx="189257" cy="178683"/>
           </a:xfrm>
           <a:prstGeom prst="rect">
@@ -5807,7 +5847,7 @@
         </p:nvSpPr>
         <p:spPr>
           <a:xfrm>
-            <a:off x="2687923" y="2564238"/>
+            <a:off x="2367667" y="2366982"/>
             <a:ext cx="189257" cy="178683"/>
           </a:xfrm>
           <a:prstGeom prst="rect">
@@ -5846,7 +5886,7 @@
         </p:nvSpPr>
         <p:spPr>
           <a:xfrm>
-            <a:off x="2656370" y="3386050"/>
+            <a:off x="2405548" y="3660461"/>
             <a:ext cx="189257" cy="178683"/>
           </a:xfrm>
           <a:prstGeom prst="rect">
@@ -5885,7 +5925,7 @@
         </p:nvSpPr>
         <p:spPr>
           <a:xfrm>
-            <a:off x="6667770" y="3210194"/>
+            <a:off x="6673052" y="3484605"/>
             <a:ext cx="189257" cy="178683"/>
           </a:xfrm>
           <a:prstGeom prst="rect">
@@ -5926,8 +5966,8 @@
         </p:nvCxnSpPr>
         <p:spPr>
           <a:xfrm rot="5400000" flipH="1" flipV="1">
-            <a:off x="3778076" y="2051743"/>
-            <a:ext cx="1275775" cy="142108"/>
+            <a:off x="3615044" y="2293729"/>
+            <a:ext cx="1258291" cy="189474"/>
           </a:xfrm>
           <a:prstGeom prst="bentConnector2">
             <a:avLst/>
@@ -5964,7 +6004,7 @@
         </p:nvSpPr>
         <p:spPr>
           <a:xfrm>
-            <a:off x="4487017" y="1311529"/>
+            <a:off x="4338926" y="1585940"/>
             <a:ext cx="1146635" cy="346760"/>
           </a:xfrm>
           <a:prstGeom prst="rect">
@@ -6020,7 +6060,7 @@
         </p:nvSpPr>
         <p:spPr>
           <a:xfrm>
-            <a:off x="4324972" y="1575218"/>
+            <a:off x="4176881" y="1849629"/>
             <a:ext cx="189257" cy="178683"/>
           </a:xfrm>
           <a:prstGeom prst="rect">
@@ -6059,7 +6099,7 @@
         </p:nvSpPr>
         <p:spPr>
           <a:xfrm>
-            <a:off x="6396313" y="510267"/>
+            <a:off x="6248222" y="784678"/>
             <a:ext cx="542913" cy="346760"/>
           </a:xfrm>
           <a:prstGeom prst="rect">
@@ -6115,7 +6155,7 @@
         </p:nvSpPr>
         <p:spPr>
           <a:xfrm rot="16200000">
-            <a:off x="4921665" y="1103017"/>
+            <a:off x="4773574" y="1377428"/>
             <a:ext cx="236048" cy="173380"/>
           </a:xfrm>
           <a:prstGeom prst="flowChartDecision">
@@ -6163,7 +6203,7 @@
         </p:nvCxnSpPr>
         <p:spPr>
           <a:xfrm rot="5400000" flipH="1" flipV="1">
-            <a:off x="5523983" y="199353"/>
+            <a:off x="5375892" y="473764"/>
             <a:ext cx="388036" cy="1356624"/>
           </a:xfrm>
           <a:prstGeom prst="bentConnector2">
@@ -6201,7 +6241,7 @@
         </p:nvSpPr>
         <p:spPr>
           <a:xfrm>
-            <a:off x="6223381" y="479854"/>
+            <a:off x="6075290" y="754265"/>
             <a:ext cx="189257" cy="178683"/>
           </a:xfrm>
           <a:prstGeom prst="rect">
@@ -6240,7 +6280,7 @@
         </p:nvSpPr>
         <p:spPr>
           <a:xfrm>
-            <a:off x="7632593" y="221975"/>
+            <a:off x="7484502" y="496386"/>
             <a:ext cx="971415" cy="285783"/>
           </a:xfrm>
           <a:prstGeom prst="rect">
@@ -6296,7 +6336,7 @@
         </p:nvSpPr>
         <p:spPr>
           <a:xfrm>
-            <a:off x="6962144" y="605938"/>
+            <a:off x="6814053" y="880349"/>
             <a:ext cx="236048" cy="173380"/>
           </a:xfrm>
           <a:prstGeom prst="flowChartDecision">
@@ -6346,7 +6386,7 @@
         </p:nvCxnSpPr>
         <p:spPr>
           <a:xfrm flipV="1">
-            <a:off x="7198192" y="364867"/>
+            <a:off x="7050101" y="639278"/>
             <a:ext cx="434401" cy="327761"/>
           </a:xfrm>
           <a:prstGeom prst="bentConnector3">
@@ -6384,7 +6424,7 @@
         </p:nvSpPr>
         <p:spPr>
           <a:xfrm>
-            <a:off x="7632593" y="544953"/>
+            <a:off x="7484502" y="819364"/>
             <a:ext cx="971415" cy="285783"/>
           </a:xfrm>
           <a:prstGeom prst="rect">
@@ -6443,7 +6483,7 @@
         </p:nvCxnSpPr>
         <p:spPr>
           <a:xfrm flipV="1">
-            <a:off x="7198192" y="687845"/>
+            <a:off x="7050101" y="962256"/>
             <a:ext cx="434401" cy="4783"/>
           </a:xfrm>
           <a:prstGeom prst="bentConnector3">
@@ -6481,7 +6521,7 @@
         </p:nvSpPr>
         <p:spPr>
           <a:xfrm>
-            <a:off x="7632593" y="867931"/>
+            <a:off x="7484502" y="1142342"/>
             <a:ext cx="971415" cy="285783"/>
           </a:xfrm>
           <a:prstGeom prst="rect">
@@ -6540,7 +6580,7 @@
         </p:nvCxnSpPr>
         <p:spPr>
           <a:xfrm>
-            <a:off x="7198192" y="692628"/>
+            <a:off x="7050101" y="967039"/>
             <a:ext cx="434401" cy="318195"/>
           </a:xfrm>
           <a:prstGeom prst="bentConnector3">
@@ -6578,7 +6618,7 @@
         </p:nvSpPr>
         <p:spPr>
           <a:xfrm>
-            <a:off x="7632594" y="1190908"/>
+            <a:off x="7484503" y="1465319"/>
             <a:ext cx="971414" cy="285783"/>
           </a:xfrm>
           <a:prstGeom prst="rect">
@@ -6637,7 +6677,7 @@
         </p:nvCxnSpPr>
         <p:spPr>
           <a:xfrm>
-            <a:off x="7198192" y="692628"/>
+            <a:off x="7050101" y="967039"/>
             <a:ext cx="434402" cy="641172"/>
           </a:xfrm>
           <a:prstGeom prst="bentConnector3">
@@ -6677,7 +6717,7 @@
         </p:nvCxnSpPr>
         <p:spPr>
           <a:xfrm rot="5400000">
-            <a:off x="6836354" y="1579566"/>
+            <a:off x="6688263" y="1853977"/>
             <a:ext cx="1384822" cy="1179073"/>
           </a:xfrm>
           <a:prstGeom prst="bentConnector3">
@@ -6717,7 +6757,7 @@
         </p:nvSpPr>
         <p:spPr>
           <a:xfrm>
-            <a:off x="6941195" y="2617787"/>
+            <a:off x="6793104" y="2892198"/>
             <a:ext cx="189257" cy="178683"/>
           </a:xfrm>
           <a:prstGeom prst="rect">
@@ -6756,7 +6796,7 @@
         </p:nvSpPr>
         <p:spPr>
           <a:xfrm>
-            <a:off x="7021863" y="1940494"/>
+            <a:off x="6873772" y="2214905"/>
             <a:ext cx="881018" cy="261610"/>
           </a:xfrm>
           <a:prstGeom prst="rect">
@@ -6805,7 +6845,7 @@
         </p:nvCxnSpPr>
         <p:spPr>
           <a:xfrm rot="16200000" flipV="1">
-            <a:off x="5534104" y="1584457"/>
+            <a:off x="5386013" y="1858868"/>
             <a:ext cx="1365642" cy="1166546"/>
           </a:xfrm>
           <a:prstGeom prst="bentConnector2">
@@ -6843,7 +6883,7 @@
         </p:nvSpPr>
         <p:spPr>
           <a:xfrm>
-            <a:off x="5694804" y="1512642"/>
+            <a:off x="5546713" y="1787053"/>
             <a:ext cx="189257" cy="178683"/>
           </a:xfrm>
           <a:prstGeom prst="rect">
@@ -6882,7 +6922,7 @@
         </p:nvSpPr>
         <p:spPr>
           <a:xfrm>
-            <a:off x="7712397" y="3854242"/>
+            <a:off x="7564306" y="4128653"/>
             <a:ext cx="815410" cy="285783"/>
           </a:xfrm>
           <a:prstGeom prst="rect">
@@ -6938,7 +6978,7 @@
         </p:nvSpPr>
         <p:spPr>
           <a:xfrm>
-            <a:off x="7712396" y="4175313"/>
+            <a:off x="7564305" y="4449724"/>
             <a:ext cx="815411" cy="285783"/>
           </a:xfrm>
           <a:prstGeom prst="rect">
@@ -6994,7 +7034,7 @@
         </p:nvCxnSpPr>
         <p:spPr>
           <a:xfrm rot="16200000" flipH="1">
-            <a:off x="7206971" y="3469684"/>
+            <a:off x="7058880" y="3744095"/>
             <a:ext cx="793649" cy="217201"/>
           </a:xfrm>
           <a:prstGeom prst="bentConnector2">
@@ -7032,7 +7072,7 @@
         </p:nvCxnSpPr>
         <p:spPr>
           <a:xfrm rot="16200000" flipH="1">
-            <a:off x="7206971" y="3795756"/>
+            <a:off x="7058880" y="4070167"/>
             <a:ext cx="793649" cy="217201"/>
           </a:xfrm>
           <a:prstGeom prst="bentConnector2">
@@ -7062,6 +7102,359 @@
           </a:fontRef>
         </p:style>
       </p:cxnSp>
+      <p:sp>
+        <p:nvSpPr>
+          <p:cNvPr id="125" name="Rectangle 8"/>
+          <p:cNvSpPr/>
+          <p:nvPr/>
+        </p:nvSpPr>
+        <p:spPr>
+          <a:xfrm>
+            <a:off x="2623158" y="2983464"/>
+            <a:ext cx="1093635" cy="346760"/>
+          </a:xfrm>
+          <a:prstGeom prst="rect">
+            <a:avLst/>
+          </a:prstGeom>
+          <a:ln w="19050">
+            <a:solidFill>
+              <a:srgbClr val="7030A0"/>
+            </a:solidFill>
+          </a:ln>
+          <a:effectLst/>
+        </p:spPr>
+        <p:style>
+          <a:lnRef idx="1">
+            <a:schemeClr val="accent4"/>
+          </a:lnRef>
+          <a:fillRef idx="2">
+            <a:schemeClr val="accent4"/>
+          </a:fillRef>
+          <a:effectRef idx="1">
+            <a:schemeClr val="accent4"/>
+          </a:effectRef>
+          <a:fontRef idx="minor">
+            <a:schemeClr val="dk1"/>
+          </a:fontRef>
+        </p:style>
+        <p:txBody>
+          <a:bodyPr rtlCol="0" anchor="ctr"/>
+          <a:lstStyle/>
+          <a:p>
+            <a:pPr algn="ctr"/>
+            <a:r>
+              <a:rPr lang="en-US" sz="1050" dirty="0" err="1" smtClean="0">
+                <a:solidFill>
+                  <a:srgbClr val="7030A0"/>
+                </a:solidFill>
+              </a:rPr>
+              <a:t>RecycleBin</a:t>
+            </a:r>
+            <a:endParaRPr lang="en-SG" sz="1050" dirty="0">
+              <a:solidFill>
+                <a:srgbClr val="7030A0"/>
+              </a:solidFill>
+            </a:endParaRPr>
+          </a:p>
+        </p:txBody>
+      </p:sp>
+      <p:cxnSp>
+        <p:nvCxnSpPr>
+          <p:cNvPr id="126" name="Straight Arrow Connector 125"/>
+          <p:cNvCxnSpPr>
+            <a:stCxn id="127" idx="3"/>
+            <a:endCxn id="125" idx="1"/>
+          </p:cNvCxnSpPr>
+          <p:nvPr/>
+        </p:nvCxnSpPr>
+        <p:spPr>
+          <a:xfrm>
+            <a:off x="2402348" y="3151560"/>
+            <a:ext cx="220810" cy="5284"/>
+          </a:xfrm>
+          <a:prstGeom prst="straightConnector1">
+            <a:avLst/>
+          </a:prstGeom>
+          <a:ln w="19050">
+            <a:solidFill>
+              <a:srgbClr val="7030A0"/>
+            </a:solidFill>
+            <a:headEnd type="none" w="med" len="med"/>
+            <a:tailEnd type="arrow" w="med" len="med"/>
+          </a:ln>
+          <a:effectLst/>
+        </p:spPr>
+        <p:style>
+          <a:lnRef idx="1">
+            <a:schemeClr val="accent2"/>
+          </a:lnRef>
+          <a:fillRef idx="2">
+            <a:schemeClr val="accent2"/>
+          </a:fillRef>
+          <a:effectRef idx="1">
+            <a:schemeClr val="accent2"/>
+          </a:effectRef>
+          <a:fontRef idx="minor">
+            <a:schemeClr val="dk1"/>
+          </a:fontRef>
+        </p:style>
+      </p:cxnSp>
+      <p:sp>
+        <p:nvSpPr>
+          <p:cNvPr id="127" name="Flowchart: Decision 96"/>
+          <p:cNvSpPr/>
+          <p:nvPr/>
+        </p:nvSpPr>
+        <p:spPr>
+          <a:xfrm>
+            <a:off x="2166300" y="3064870"/>
+            <a:ext cx="236048" cy="173380"/>
+          </a:xfrm>
+          <a:prstGeom prst="flowChartDecision">
+            <a:avLst/>
+          </a:prstGeom>
+          <a:noFill/>
+          <a:ln w="19050">
+            <a:solidFill>
+              <a:srgbClr val="7030A0"/>
+            </a:solidFill>
+          </a:ln>
+          <a:effectLst/>
+        </p:spPr>
+        <p:style>
+          <a:lnRef idx="1">
+            <a:schemeClr val="accent6"/>
+          </a:lnRef>
+          <a:fillRef idx="2">
+            <a:schemeClr val="accent6"/>
+          </a:fillRef>
+          <a:effectRef idx="1">
+            <a:schemeClr val="accent6"/>
+          </a:effectRef>
+          <a:fontRef idx="minor">
+            <a:schemeClr val="dk1"/>
+          </a:fontRef>
+        </p:style>
+        <p:txBody>
+          <a:bodyPr rtlCol="0" anchor="ctr"/>
+          <a:lstStyle/>
+          <a:p>
+            <a:pPr algn="ctr"/>
+            <a:endParaRPr lang="en-US" sz="1050"/>
+          </a:p>
+        </p:txBody>
+      </p:sp>
+      <p:sp>
+        <p:nvSpPr>
+          <p:cNvPr id="128" name="TextBox 127"/>
+          <p:cNvSpPr txBox="1"/>
+          <p:nvPr/>
+        </p:nvSpPr>
+        <p:spPr>
+          <a:xfrm>
+            <a:off x="2431591" y="2920282"/>
+            <a:ext cx="189257" cy="178683"/>
+          </a:xfrm>
+          <a:prstGeom prst="rect">
+            <a:avLst/>
+          </a:prstGeom>
+          <a:noFill/>
+        </p:spPr>
+        <p:txBody>
+          <a:bodyPr wrap="square" lIns="0" tIns="0" rIns="0" bIns="0" rtlCol="0">
+            <a:noAutofit/>
+          </a:bodyPr>
+          <a:lstStyle/>
+          <a:p>
+            <a:pPr algn="ctr"/>
+            <a:r>
+              <a:rPr lang="en-US" sz="1100" dirty="0" smtClean="0">
+                <a:solidFill>
+                  <a:srgbClr val="7030A0"/>
+                </a:solidFill>
+              </a:rPr>
+              <a:t>1</a:t>
+            </a:r>
+            <a:endParaRPr lang="en-SG" sz="1100" dirty="0">
+              <a:solidFill>
+                <a:srgbClr val="7030A0"/>
+              </a:solidFill>
+            </a:endParaRPr>
+          </a:p>
+        </p:txBody>
+      </p:sp>
+      <p:cxnSp>
+        <p:nvCxnSpPr>
+          <p:cNvPr id="129" name="Elbow Connector 128"/>
+          <p:cNvCxnSpPr>
+            <a:stCxn id="48" idx="3"/>
+            <a:endCxn id="46" idx="1"/>
+          </p:cNvCxnSpPr>
+          <p:nvPr/>
+        </p:nvCxnSpPr>
+        <p:spPr>
+          <a:xfrm rot="16200000" flipH="1">
+            <a:off x="2247217" y="2242001"/>
+            <a:ext cx="94254" cy="653007"/>
+          </a:xfrm>
+          <a:prstGeom prst="bentConnector4">
+            <a:avLst>
+              <a:gd name="adj1" fmla="val -242536"/>
+              <a:gd name="adj2" fmla="val 59037"/>
+            </a:avLst>
+          </a:prstGeom>
+          <a:ln w="19050">
+            <a:solidFill>
+              <a:srgbClr val="7030A0"/>
+            </a:solidFill>
+            <a:headEnd type="none" w="med" len="med"/>
+            <a:tailEnd type="arrow" w="med" len="med"/>
+          </a:ln>
+          <a:effectLst/>
+        </p:spPr>
+        <p:style>
+          <a:lnRef idx="1">
+            <a:schemeClr val="accent2"/>
+          </a:lnRef>
+          <a:fillRef idx="2">
+            <a:schemeClr val="accent2"/>
+          </a:fillRef>
+          <a:effectRef idx="1">
+            <a:schemeClr val="accent2"/>
+          </a:effectRef>
+          <a:fontRef idx="minor">
+            <a:schemeClr val="dk1"/>
+          </a:fontRef>
+        </p:style>
+      </p:cxnSp>
+      <p:sp>
+        <p:nvSpPr>
+          <p:cNvPr id="132" name="Flowchart: Decision 96"/>
+          <p:cNvSpPr/>
+          <p:nvPr/>
+        </p:nvSpPr>
+        <p:spPr>
+          <a:xfrm>
+            <a:off x="3736877" y="3063243"/>
+            <a:ext cx="236048" cy="173380"/>
+          </a:xfrm>
+          <a:prstGeom prst="flowChartDecision">
+            <a:avLst/>
+          </a:prstGeom>
+          <a:solidFill>
+            <a:srgbClr val="7030A0"/>
+          </a:solidFill>
+          <a:ln w="19050">
+            <a:solidFill>
+              <a:srgbClr val="7030A0"/>
+            </a:solidFill>
+          </a:ln>
+          <a:effectLst/>
+        </p:spPr>
+        <p:style>
+          <a:lnRef idx="1">
+            <a:schemeClr val="accent6"/>
+          </a:lnRef>
+          <a:fillRef idx="2">
+            <a:schemeClr val="accent6"/>
+          </a:fillRef>
+          <a:effectRef idx="1">
+            <a:schemeClr val="accent6"/>
+          </a:effectRef>
+          <a:fontRef idx="minor">
+            <a:schemeClr val="dk1"/>
+          </a:fontRef>
+        </p:style>
+        <p:txBody>
+          <a:bodyPr rtlCol="0" anchor="ctr"/>
+          <a:lstStyle/>
+          <a:p>
+            <a:pPr algn="ctr"/>
+            <a:endParaRPr lang="en-US" sz="1050"/>
+          </a:p>
+        </p:txBody>
+      </p:sp>
+      <p:cxnSp>
+        <p:nvCxnSpPr>
+          <p:cNvPr id="134" name="Elbow Connector 133"/>
+          <p:cNvCxnSpPr>
+            <a:stCxn id="132" idx="3"/>
+          </p:cNvCxnSpPr>
+          <p:nvPr/>
+        </p:nvCxnSpPr>
+        <p:spPr>
+          <a:xfrm>
+            <a:off x="3972925" y="3149933"/>
+            <a:ext cx="356312" cy="246059"/>
+          </a:xfrm>
+          <a:prstGeom prst="bentConnector3">
+            <a:avLst>
+              <a:gd name="adj1" fmla="val 30218"/>
+            </a:avLst>
+          </a:prstGeom>
+          <a:ln w="19050">
+            <a:solidFill>
+              <a:srgbClr val="7030A0"/>
+            </a:solidFill>
+            <a:headEnd type="none" w="med" len="med"/>
+            <a:tailEnd type="arrow" w="med" len="med"/>
+          </a:ln>
+          <a:effectLst/>
+        </p:spPr>
+        <p:style>
+          <a:lnRef idx="1">
+            <a:schemeClr val="accent2"/>
+          </a:lnRef>
+          <a:fillRef idx="2">
+            <a:schemeClr val="accent2"/>
+          </a:fillRef>
+          <a:effectRef idx="1">
+            <a:schemeClr val="accent2"/>
+          </a:effectRef>
+          <a:fontRef idx="minor">
+            <a:schemeClr val="dk1"/>
+          </a:fontRef>
+        </p:style>
+      </p:cxnSp>
+      <p:sp>
+        <p:nvSpPr>
+          <p:cNvPr id="138" name="TextBox 137"/>
+          <p:cNvSpPr txBox="1"/>
+          <p:nvPr/>
+        </p:nvSpPr>
+        <p:spPr>
+          <a:xfrm>
+            <a:off x="4151897" y="3454939"/>
+            <a:ext cx="189257" cy="178683"/>
+          </a:xfrm>
+          <a:prstGeom prst="rect">
+            <a:avLst/>
+          </a:prstGeom>
+          <a:noFill/>
+        </p:spPr>
+        <p:txBody>
+          <a:bodyPr wrap="square" lIns="0" tIns="0" rIns="0" bIns="0" rtlCol="0">
+            <a:noAutofit/>
+          </a:bodyPr>
+          <a:lstStyle/>
+          <a:p>
+            <a:pPr algn="ctr"/>
+            <a:r>
+              <a:rPr lang="en-US" sz="1100" dirty="0" smtClean="0">
+                <a:solidFill>
+                  <a:srgbClr val="7030A0"/>
+                </a:solidFill>
+              </a:rPr>
+              <a:t>1</a:t>
+            </a:r>
+            <a:endParaRPr lang="en-SG" sz="1100" dirty="0">
+              <a:solidFill>
+                <a:srgbClr val="7030A0"/>
+              </a:solidFill>
+            </a:endParaRPr>
+          </a:p>
+        </p:txBody>
+      </p:sp>
     </p:spTree>
     <p:extLst>
       <p:ext uri="{BB962C8B-B14F-4D97-AF65-F5344CB8AC3E}">

</xml_diff>